<commit_message>
Updated index e slides
</commit_message>
<xml_diff>
--- a/docs/weople/slide.pptx
+++ b/docs/weople/slide.pptx
@@ -212,7 +212,7 @@
           <a:p>
             <a:fld id="{42FF68D7-8371-3844-AE0E-5749CE25D6E3}" type="datetimeFigureOut">
               <a:rPr lang="it-IT" smtClean="0"/>
-              <a:t>13/04/2021</a:t>
+              <a:t>14/04/2021</a:t>
             </a:fld>
             <a:endParaRPr lang="it-IT"/>
           </a:p>
@@ -626,7 +626,7 @@
           <a:p>
             <a:fld id="{F4641EC1-0CC1-464A-8D43-E9BC37436022}" type="datetimeFigureOut">
               <a:rPr lang="it-IT" smtClean="0"/>
-              <a:t>13/04/2021</a:t>
+              <a:t>14/04/2021</a:t>
             </a:fld>
             <a:endParaRPr lang="it-IT"/>
           </a:p>
@@ -824,7 +824,7 @@
           <a:p>
             <a:fld id="{F4641EC1-0CC1-464A-8D43-E9BC37436022}" type="datetimeFigureOut">
               <a:rPr lang="it-IT" smtClean="0"/>
-              <a:t>13/04/2021</a:t>
+              <a:t>14/04/2021</a:t>
             </a:fld>
             <a:endParaRPr lang="it-IT"/>
           </a:p>
@@ -1032,7 +1032,7 @@
           <a:p>
             <a:fld id="{F4641EC1-0CC1-464A-8D43-E9BC37436022}" type="datetimeFigureOut">
               <a:rPr lang="it-IT" smtClean="0"/>
-              <a:t>13/04/2021</a:t>
+              <a:t>14/04/2021</a:t>
             </a:fld>
             <a:endParaRPr lang="it-IT"/>
           </a:p>
@@ -1883,7 +1883,7 @@
           <a:p>
             <a:fld id="{05718D35-6F3B-4396-A26E-ABD7D6D0C018}" type="datetimeFigureOut">
               <a:rPr lang="it-IT" smtClean="0"/>
-              <a:t>13/04/2021</a:t>
+              <a:t>14/04/2021</a:t>
             </a:fld>
             <a:endParaRPr lang="it-IT"/>
           </a:p>
@@ -2024,7 +2024,7 @@
           <a:p>
             <a:fld id="{05718D35-6F3B-4396-A26E-ABD7D6D0C018}" type="datetimeFigureOut">
               <a:rPr lang="it-IT" smtClean="0"/>
-              <a:t>13/04/2021</a:t>
+              <a:t>14/04/2021</a:t>
             </a:fld>
             <a:endParaRPr lang="it-IT"/>
           </a:p>
@@ -2303,7 +2303,7 @@
           <a:p>
             <a:fld id="{F4641EC1-0CC1-464A-8D43-E9BC37436022}" type="datetimeFigureOut">
               <a:rPr lang="it-IT" smtClean="0"/>
-              <a:t>13/04/2021</a:t>
+              <a:t>14/04/2021</a:t>
             </a:fld>
             <a:endParaRPr lang="it-IT"/>
           </a:p>
@@ -3314,7 +3314,7 @@
           <a:p>
             <a:fld id="{F4641EC1-0CC1-464A-8D43-E9BC37436022}" type="datetimeFigureOut">
               <a:rPr lang="it-IT" smtClean="0"/>
-              <a:t>13/04/2021</a:t>
+              <a:t>14/04/2021</a:t>
             </a:fld>
             <a:endParaRPr lang="it-IT"/>
           </a:p>
@@ -5373,7 +5373,7 @@
           <a:p>
             <a:fld id="{F4641EC1-0CC1-464A-8D43-E9BC37436022}" type="datetimeFigureOut">
               <a:rPr lang="it-IT" smtClean="0"/>
-              <a:t>13/04/2021</a:t>
+              <a:t>14/04/2021</a:t>
             </a:fld>
             <a:endParaRPr lang="it-IT"/>
           </a:p>
@@ -5785,7 +5785,7 @@
           <a:p>
             <a:fld id="{F4641EC1-0CC1-464A-8D43-E9BC37436022}" type="datetimeFigureOut">
               <a:rPr lang="it-IT" smtClean="0"/>
-              <a:t>13/04/2021</a:t>
+              <a:t>14/04/2021</a:t>
             </a:fld>
             <a:endParaRPr lang="it-IT"/>
           </a:p>
@@ -5926,7 +5926,7 @@
           <a:p>
             <a:fld id="{F4641EC1-0CC1-464A-8D43-E9BC37436022}" type="datetimeFigureOut">
               <a:rPr lang="it-IT" smtClean="0"/>
-              <a:t>13/04/2021</a:t>
+              <a:t>14/04/2021</a:t>
             </a:fld>
             <a:endParaRPr lang="it-IT"/>
           </a:p>
@@ -6039,7 +6039,7 @@
           <a:p>
             <a:fld id="{F4641EC1-0CC1-464A-8D43-E9BC37436022}" type="datetimeFigureOut">
               <a:rPr lang="it-IT" smtClean="0"/>
-              <a:t>13/04/2021</a:t>
+              <a:t>14/04/2021</a:t>
             </a:fld>
             <a:endParaRPr lang="it-IT"/>
           </a:p>
@@ -6350,7 +6350,7 @@
           <a:p>
             <a:fld id="{F4641EC1-0CC1-464A-8D43-E9BC37436022}" type="datetimeFigureOut">
               <a:rPr lang="it-IT" smtClean="0"/>
-              <a:t>13/04/2021</a:t>
+              <a:t>14/04/2021</a:t>
             </a:fld>
             <a:endParaRPr lang="it-IT"/>
           </a:p>
@@ -6638,7 +6638,7 @@
           <a:p>
             <a:fld id="{F4641EC1-0CC1-464A-8D43-E9BC37436022}" type="datetimeFigureOut">
               <a:rPr lang="it-IT" smtClean="0"/>
-              <a:t>13/04/2021</a:t>
+              <a:t>14/04/2021</a:t>
             </a:fld>
             <a:endParaRPr lang="it-IT"/>
           </a:p>
@@ -6879,7 +6879,7 @@
           <a:p>
             <a:fld id="{F4641EC1-0CC1-464A-8D43-E9BC37436022}" type="datetimeFigureOut">
               <a:rPr lang="it-IT" smtClean="0"/>
-              <a:t>13/04/2021</a:t>
+              <a:t>14/04/2021</a:t>
             </a:fld>
             <a:endParaRPr lang="it-IT"/>
           </a:p>
@@ -10474,7 +10474,7 @@
         <p:spPr>
           <a:xfrm>
             <a:off x="847561" y="1118583"/>
-            <a:ext cx="10558463" cy="5016758"/>
+            <a:ext cx="10558463" cy="5509200"/>
           </a:xfrm>
           <a:prstGeom prst="rect">
             <a:avLst/>
@@ -10932,7 +10932,7 @@
             </a:r>
             <a:r>
               <a:rPr lang="en-GB" sz="1600" dirty="0"/>
-              <a:t> privacy ed </a:t>
+              <a:t> privacy, </a:t>
             </a:r>
             <a:r>
               <a:rPr lang="en-GB" sz="1600" dirty="0" err="1"/>
@@ -10941,6 +10941,30 @@
             <a:r>
               <a:rPr lang="en-GB" sz="1600" dirty="0"/>
               <a:t> </a:t>
+            </a:r>
+            <a:r>
+              <a:rPr lang="en-GB" sz="1600" dirty="0" err="1"/>
+              <a:t>sicuro</a:t>
+            </a:r>
+            <a:r>
+              <a:rPr lang="en-GB" sz="1600" dirty="0"/>
+              <a:t> (</a:t>
+            </a:r>
+            <a:r>
+              <a:rPr lang="en-GB" sz="1600" dirty="0" err="1"/>
+              <a:t>cioè</a:t>
+            </a:r>
+            <a:r>
+              <a:rPr lang="en-GB" sz="1600" dirty="0"/>
+              <a:t> ben </a:t>
+            </a:r>
+            <a:r>
+              <a:rPr lang="en-GB" sz="1600" dirty="0" err="1"/>
+              <a:t>mirato</a:t>
+            </a:r>
+            <a:r>
+              <a:rPr lang="en-GB" sz="1600" dirty="0"/>
+              <a:t>) ed </a:t>
             </a:r>
             <a:r>
               <a:rPr lang="en-GB" sz="1600" dirty="0" err="1"/>
@@ -10958,7 +10982,31 @@
             </a:pPr>
             <a:r>
               <a:rPr lang="en-GB" sz="1600" dirty="0"/>
-              <a:t>Per Hoda - </a:t>
+              <a:t>Per Hoda, </a:t>
+            </a:r>
+            <a:r>
+              <a:rPr lang="en-GB" sz="1600" dirty="0" err="1"/>
+              <a:t>pensando</a:t>
+            </a:r>
+            <a:r>
+              <a:rPr lang="en-GB" sz="1600" dirty="0"/>
+              <a:t> </a:t>
+            </a:r>
+            <a:r>
+              <a:rPr lang="en-GB" sz="1600" dirty="0" err="1"/>
+              <a:t>all'intermediazione</a:t>
+            </a:r>
+            <a:r>
+              <a:rPr lang="en-GB" sz="1600" dirty="0"/>
+              <a:t> </a:t>
+            </a:r>
+            <a:r>
+              <a:rPr lang="en-GB" sz="1600" dirty="0" err="1"/>
+              <a:t>digitale</a:t>
+            </a:r>
+            <a:r>
+              <a:rPr lang="en-GB" sz="1600" dirty="0"/>
+              <a:t>, </a:t>
             </a:r>
             <a:r>
               <a:rPr lang="en-GB" sz="1600" dirty="0" err="1"/>
@@ -10998,11 +11046,11 @@
             </a:r>
             <a:r>
               <a:rPr lang="en-GB" sz="1600" dirty="0"/>
-              <a:t> non </a:t>
+              <a:t> </a:t>
             </a:r>
             <a:r>
               <a:rPr lang="en-GB" sz="1600" dirty="0" err="1"/>
-              <a:t>personali</a:t>
+              <a:t>investiti</a:t>
             </a:r>
             <a:r>
               <a:rPr lang="en-GB" sz="1600" dirty="0"/>
@@ -11010,7 +11058,7 @@
             </a:r>
             <a:r>
               <a:rPr lang="en-GB" sz="1600" dirty="0" err="1"/>
-              <a:t>investiti</a:t>
+              <a:t>dalle</a:t>
             </a:r>
             <a:r>
               <a:rPr lang="en-GB" sz="1600" dirty="0"/>
@@ -11018,7 +11066,23 @@
             </a:r>
             <a:r>
               <a:rPr lang="en-GB" sz="1600" dirty="0" err="1"/>
-              <a:t>dalle</a:t>
+              <a:t>persone</a:t>
+            </a:r>
+            <a:r>
+              <a:rPr lang="en-GB" sz="1600" dirty="0"/>
+              <a:t>, </a:t>
+            </a:r>
+            <a:r>
+              <a:rPr lang="en-GB" sz="1600" dirty="0" err="1"/>
+              <a:t>quindi</a:t>
+            </a:r>
+            <a:r>
+              <a:rPr lang="en-GB" sz="1600" dirty="0"/>
+              <a:t> un </a:t>
+            </a:r>
+            <a:r>
+              <a:rPr lang="en-GB" sz="1600" dirty="0" err="1"/>
+              <a:t>ulteriore</a:t>
             </a:r>
             <a:r>
               <a:rPr lang="en-GB" sz="1600" dirty="0"/>
@@ -11026,7 +11090,172 @@
             </a:r>
             <a:r>
               <a:rPr lang="en-GB" sz="1600" dirty="0" err="1"/>
+              <a:t>fonte</a:t>
+            </a:r>
+            <a:r>
+              <a:rPr lang="en-GB" sz="1600" dirty="0"/>
+              <a:t> di </a:t>
+            </a:r>
+            <a:r>
+              <a:rPr lang="en-GB" sz="1600" dirty="0" err="1"/>
+              <a:t>profitto</a:t>
+            </a:r>
+            <a:r>
+              <a:rPr lang="en-GB" sz="1600" dirty="0"/>
+              <a:t> </a:t>
+            </a:r>
+            <a:r>
+              <a:rPr lang="en-GB" sz="1600" dirty="0" err="1"/>
+              <a:t>che</a:t>
+            </a:r>
+            <a:r>
+              <a:rPr lang="en-GB" sz="1600" dirty="0"/>
+              <a:t> </a:t>
+            </a:r>
+            <a:r>
+              <a:rPr lang="en-GB" sz="1600" dirty="0" err="1"/>
+              <a:t>sarebbe</a:t>
+            </a:r>
+            <a:r>
+              <a:rPr lang="en-GB" sz="1600" dirty="0"/>
+              <a:t> poi </a:t>
+            </a:r>
+            <a:r>
+              <a:rPr lang="en-GB" sz="1600" dirty="0" err="1"/>
+              <a:t>restituita</a:t>
+            </a:r>
+            <a:r>
+              <a:rPr lang="en-GB" sz="1600" dirty="0"/>
+              <a:t> alle </a:t>
+            </a:r>
+            <a:r>
+              <a:rPr lang="en-GB" sz="1600" dirty="0" err="1"/>
+              <a:t>stesse</a:t>
+            </a:r>
+            <a:r>
+              <a:rPr lang="en-GB" sz="1600" dirty="0"/>
+              <a:t> </a:t>
+            </a:r>
+            <a:r>
+              <a:rPr lang="en-GB" sz="1600" dirty="0" err="1"/>
               <a:t>persone</a:t>
+            </a:r>
+            <a:r>
+              <a:rPr lang="en-GB" sz="1600" dirty="0"/>
+              <a:t> </a:t>
+            </a:r>
+            <a:r>
+              <a:rPr lang="en-GB" sz="1600" dirty="0" err="1"/>
+              <a:t>nella</a:t>
+            </a:r>
+            <a:r>
+              <a:rPr lang="en-GB" sz="1600" dirty="0"/>
+              <a:t> </a:t>
+            </a:r>
+            <a:r>
+              <a:rPr lang="en-GB" sz="1600" dirty="0" err="1"/>
+              <a:t>misura</a:t>
+            </a:r>
+            <a:r>
+              <a:rPr lang="en-GB" sz="1600" dirty="0"/>
+              <a:t> del 90%, al </a:t>
+            </a:r>
+            <a:r>
+              <a:rPr lang="en-GB" sz="1600" dirty="0" err="1"/>
+              <a:t>netto</a:t>
+            </a:r>
+            <a:r>
+              <a:rPr lang="en-GB" sz="1600" dirty="0"/>
+              <a:t> </a:t>
+            </a:r>
+            <a:r>
+              <a:rPr lang="en-GB" sz="1600" dirty="0" err="1"/>
+              <a:t>dei</a:t>
+            </a:r>
+            <a:r>
+              <a:rPr lang="en-GB" sz="1600" dirty="0"/>
+              <a:t> </a:t>
+            </a:r>
+            <a:r>
+              <a:rPr lang="en-GB" sz="1600" dirty="0" err="1"/>
+              <a:t>costi</a:t>
+            </a:r>
+            <a:r>
+              <a:rPr lang="en-GB" sz="1600" dirty="0"/>
+              <a:t> di </a:t>
+            </a:r>
+            <a:r>
+              <a:rPr lang="en-GB" sz="1600" dirty="0" err="1"/>
+              <a:t>gestione</a:t>
+            </a:r>
+            <a:r>
+              <a:rPr lang="en-GB" sz="1600" dirty="0"/>
+              <a:t>.</a:t>
+            </a:r>
+          </a:p>
+          <a:p>
+            <a:endParaRPr lang="en-GB" sz="1600" dirty="0"/>
+          </a:p>
+          <a:p>
+            <a:r>
+              <a:rPr lang="en-GB" sz="1600" dirty="0" err="1"/>
+              <a:t>Oltre</a:t>
+            </a:r>
+            <a:r>
+              <a:rPr lang="en-GB" sz="1600" dirty="0"/>
+              <a:t> </a:t>
+            </a:r>
+            <a:r>
+              <a:rPr lang="en-GB" sz="1600" dirty="0" err="1"/>
+              <a:t>all’aspetto</a:t>
+            </a:r>
+            <a:r>
+              <a:rPr lang="en-GB" sz="1600" dirty="0"/>
+              <a:t> </a:t>
+            </a:r>
+            <a:r>
+              <a:rPr lang="en-GB" sz="1600" dirty="0" err="1"/>
+              <a:t>economico</a:t>
+            </a:r>
+            <a:r>
+              <a:rPr lang="en-GB" sz="1600" dirty="0"/>
+              <a:t>, non </a:t>
+            </a:r>
+            <a:r>
+              <a:rPr lang="en-GB" sz="1600" dirty="0" err="1"/>
+              <a:t>dobbiamo</a:t>
+            </a:r>
+            <a:r>
+              <a:rPr lang="en-GB" sz="1600" dirty="0"/>
+              <a:t> </a:t>
+            </a:r>
+            <a:r>
+              <a:rPr lang="en-GB" sz="1600" dirty="0" err="1"/>
+              <a:t>sottovalutare</a:t>
+            </a:r>
+            <a:r>
+              <a:rPr lang="en-GB" sz="1600" dirty="0"/>
+              <a:t> </a:t>
+            </a:r>
+            <a:r>
+              <a:rPr lang="en-GB" sz="1600" dirty="0" err="1"/>
+              <a:t>anche</a:t>
+            </a:r>
+            <a:r>
+              <a:rPr lang="en-GB" sz="1600" dirty="0"/>
+              <a:t> </a:t>
+            </a:r>
+            <a:r>
+              <a:rPr lang="en-GB" sz="1600" dirty="0" err="1"/>
+              <a:t>l’aspetto</a:t>
+            </a:r>
+            <a:r>
+              <a:rPr lang="en-GB" sz="1600" dirty="0"/>
+              <a:t> </a:t>
+            </a:r>
+            <a:r>
+              <a:rPr lang="en-GB" sz="1600" dirty="0" err="1"/>
+              <a:t>etico</a:t>
             </a:r>
             <a:r>
               <a:rPr lang="en-GB" sz="1600" dirty="0"/>
@@ -11034,15 +11263,7 @@
             </a:r>
             <a:r>
               <a:rPr lang="en-GB" sz="1600" dirty="0" err="1"/>
-              <a:t>quindi</a:t>
-            </a:r>
-            <a:r>
-              <a:rPr lang="en-GB" sz="1600" dirty="0"/>
-              <a:t> un </a:t>
-            </a:r>
-            <a:r>
-              <a:rPr lang="en-GB" sz="1600" dirty="0" err="1"/>
-              <a:t>ulteriore</a:t>
+              <a:t>fondamentale</a:t>
             </a:r>
             <a:r>
               <a:rPr lang="en-GB" sz="1600" dirty="0"/>
@@ -11050,7 +11271,23 @@
             </a:r>
             <a:r>
               <a:rPr lang="en-GB" sz="1600" dirty="0" err="1"/>
-              <a:t>fonte</a:t>
+              <a:t>quando</a:t>
+            </a:r>
+            <a:r>
+              <a:rPr lang="en-GB" sz="1600" dirty="0"/>
+              <a:t> </a:t>
+            </a:r>
+            <a:r>
+              <a:rPr lang="en-GB" sz="1600" dirty="0" err="1"/>
+              <a:t>si</a:t>
+            </a:r>
+            <a:r>
+              <a:rPr lang="en-GB" sz="1600" dirty="0"/>
+              <a:t> </a:t>
+            </a:r>
+            <a:r>
+              <a:rPr lang="en-GB" sz="1600" dirty="0" err="1"/>
+              <a:t>parla</a:t>
             </a:r>
             <a:r>
               <a:rPr lang="en-GB" sz="1600" dirty="0"/>
@@ -11058,7 +11295,7 @@
             </a:r>
             <a:r>
               <a:rPr lang="en-GB" sz="1600" dirty="0" err="1"/>
-              <a:t>profitto</a:t>
+              <a:t>utilizzo</a:t>
             </a:r>
             <a:r>
               <a:rPr lang="en-GB" sz="1600" dirty="0"/>
@@ -11066,7 +11303,7 @@
             </a:r>
             <a:r>
               <a:rPr lang="en-GB" sz="1600" dirty="0" err="1"/>
-              <a:t>che</a:t>
+              <a:t>dei</a:t>
             </a:r>
             <a:r>
               <a:rPr lang="en-GB" sz="1600" dirty="0"/>
@@ -11074,23 +11311,31 @@
             </a:r>
             <a:r>
               <a:rPr lang="en-GB" sz="1600" dirty="0" err="1"/>
-              <a:t>sarebbe</a:t>
+              <a:t>dati</a:t>
             </a:r>
             <a:r>
               <a:rPr lang="en-GB" sz="1600" dirty="0"/>
-              <a:t> poi </a:t>
+              <a:t>, in </a:t>
             </a:r>
             <a:r>
               <a:rPr lang="en-GB" sz="1600" dirty="0" err="1"/>
-              <a:t>restituita</a:t>
+              <a:t>quanto</a:t>
             </a:r>
             <a:r>
               <a:rPr lang="en-GB" sz="1600" dirty="0"/>
-              <a:t> alle </a:t>
+              <a:t> la </a:t>
             </a:r>
             <a:r>
               <a:rPr lang="en-GB" sz="1600" dirty="0" err="1"/>
-              <a:t>stesse</a:t>
+              <a:t>soluzione</a:t>
+            </a:r>
+            <a:r>
+              <a:rPr lang="en-GB" sz="1600" dirty="0"/>
+              <a:t> è </a:t>
+            </a:r>
+            <a:r>
+              <a:rPr lang="en-GB" sz="1600" dirty="0" err="1"/>
+              <a:t>totalmente</a:t>
             </a:r>
             <a:r>
               <a:rPr lang="en-GB" sz="1600" dirty="0"/>
@@ -11098,7 +11343,31 @@
             </a:r>
             <a:r>
               <a:rPr lang="en-GB" sz="1600" dirty="0" err="1"/>
-              <a:t>persone</a:t>
+              <a:t>trasparente</a:t>
+            </a:r>
+            <a:r>
+              <a:rPr lang="en-GB" sz="1600" dirty="0"/>
+              <a:t> e </a:t>
+            </a:r>
+            <a:r>
+              <a:rPr lang="en-GB" sz="1600" dirty="0" err="1"/>
+              <a:t>contribuirebbe</a:t>
+            </a:r>
+            <a:r>
+              <a:rPr lang="en-GB" sz="1600" dirty="0"/>
+              <a:t> non poco ad </a:t>
+            </a:r>
+            <a:r>
+              <a:rPr lang="en-GB" sz="1600" dirty="0" err="1"/>
+              <a:t>aumentare</a:t>
+            </a:r>
+            <a:r>
+              <a:rPr lang="en-GB" sz="1600" dirty="0"/>
+              <a:t> la </a:t>
+            </a:r>
+            <a:r>
+              <a:rPr lang="en-GB" sz="1600" dirty="0" err="1"/>
+              <a:t>consapevolezza</a:t>
             </a:r>
             <a:r>
               <a:rPr lang="en-GB" sz="1600" dirty="0"/>
@@ -11106,7 +11375,7 @@
             </a:r>
             <a:r>
               <a:rPr lang="en-GB" sz="1600" dirty="0" err="1"/>
-              <a:t>nella</a:t>
+              <a:t>delle</a:t>
             </a:r>
             <a:r>
               <a:rPr lang="en-GB" sz="1600" dirty="0"/>
@@ -11114,15 +11383,7 @@
             </a:r>
             <a:r>
               <a:rPr lang="en-GB" sz="1600" dirty="0" err="1"/>
-              <a:t>misura</a:t>
-            </a:r>
-            <a:r>
-              <a:rPr lang="en-GB" sz="1600" dirty="0"/>
-              <a:t> del 90%, al </a:t>
-            </a:r>
-            <a:r>
-              <a:rPr lang="en-GB" sz="1600" dirty="0" err="1"/>
-              <a:t>netto</a:t>
+              <a:t>persone</a:t>
             </a:r>
             <a:r>
               <a:rPr lang="en-GB" sz="1600" dirty="0"/>
@@ -11130,7 +11391,7 @@
             </a:r>
             <a:r>
               <a:rPr lang="en-GB" sz="1600" dirty="0" err="1"/>
-              <a:t>dei</a:t>
+              <a:t>sull’importanza</a:t>
             </a:r>
             <a:r>
               <a:rPr lang="en-GB" sz="1600" dirty="0"/>
@@ -11138,28 +11399,7 @@
             </a:r>
             <a:r>
               <a:rPr lang="en-GB" sz="1600" dirty="0" err="1"/>
-              <a:t>costi</a:t>
-            </a:r>
-            <a:r>
-              <a:rPr lang="en-GB" sz="1600" dirty="0"/>
-              <a:t> di </a:t>
-            </a:r>
-            <a:r>
-              <a:rPr lang="en-GB" sz="1600" dirty="0" err="1"/>
-              <a:t>gestione</a:t>
-            </a:r>
-            <a:r>
-              <a:rPr lang="en-GB" sz="1600" dirty="0"/>
-              <a:t>.</a:t>
-            </a:r>
-          </a:p>
-          <a:p>
-            <a:endParaRPr lang="en-GB" sz="1600" dirty="0"/>
-          </a:p>
-          <a:p>
-            <a:r>
-              <a:rPr lang="en-GB" sz="1600" dirty="0" err="1"/>
-              <a:t>Oltre</a:t>
+              <a:t>dei</a:t>
             </a:r>
             <a:r>
               <a:rPr lang="en-GB" sz="1600" dirty="0"/>
@@ -11167,7 +11407,7 @@
             </a:r>
             <a:r>
               <a:rPr lang="en-GB" sz="1600" dirty="0" err="1"/>
-              <a:t>all’aspetto</a:t>
+              <a:t>propri</a:t>
             </a:r>
             <a:r>
               <a:rPr lang="en-GB" sz="1600" dirty="0"/>
@@ -11175,15 +11415,52 @@
             </a:r>
             <a:r>
               <a:rPr lang="en-GB" sz="1600" dirty="0" err="1"/>
-              <a:t>economico</a:t>
+              <a:t>dati</a:t>
             </a:r>
             <a:r>
               <a:rPr lang="en-GB" sz="1600" dirty="0"/>
-              <a:t>, non </a:t>
+              <a:t>, </a:t>
             </a:r>
             <a:r>
               <a:rPr lang="en-GB" sz="1600" dirty="0" err="1"/>
-              <a:t>dobbiamo</a:t>
+              <a:t>avvicinandole</a:t>
+            </a:r>
+            <a:r>
+              <a:rPr lang="en-GB" sz="1600" dirty="0"/>
+              <a:t> al </a:t>
+            </a:r>
+            <a:r>
+              <a:rPr lang="en-GB" sz="1600" dirty="0" err="1"/>
+              <a:t>mondo</a:t>
+            </a:r>
+            <a:r>
+              <a:rPr lang="en-GB" sz="1600" dirty="0"/>
+              <a:t>, in </a:t>
+            </a:r>
+            <a:r>
+              <a:rPr lang="en-GB" sz="1600" dirty="0" err="1"/>
+              <a:t>sviluppo</a:t>
+            </a:r>
+            <a:r>
+              <a:rPr lang="en-GB" sz="1600" dirty="0"/>
+              <a:t>, </a:t>
+            </a:r>
+            <a:r>
+              <a:rPr lang="en-GB" sz="1600" dirty="0" err="1"/>
+              <a:t>degli</a:t>
+            </a:r>
+            <a:r>
+              <a:rPr lang="en-GB" sz="1600" dirty="0"/>
+              <a:t> smart contract</a:t>
+            </a:r>
+          </a:p>
+          <a:p>
+            <a:endParaRPr lang="en-GB" sz="1600" dirty="0"/>
+          </a:p>
+          <a:p>
+            <a:r>
+              <a:rPr lang="en-GB" sz="1600" dirty="0" err="1"/>
+              <a:t>Questo</a:t>
             </a:r>
             <a:r>
               <a:rPr lang="en-GB" sz="1600" dirty="0"/>
@@ -11191,7 +11468,7 @@
             </a:r>
             <a:r>
               <a:rPr lang="en-GB" sz="1600" dirty="0" err="1"/>
-              <a:t>sottovalutare</a:t>
+              <a:t>servizio</a:t>
             </a:r>
             <a:r>
               <a:rPr lang="en-GB" sz="1600" dirty="0"/>
@@ -11199,7 +11476,7 @@
             </a:r>
             <a:r>
               <a:rPr lang="en-GB" sz="1600" dirty="0" err="1"/>
-              <a:t>anche</a:t>
+              <a:t>darebbe</a:t>
             </a:r>
             <a:r>
               <a:rPr lang="en-GB" sz="1600" dirty="0"/>
@@ -11207,7 +11484,7 @@
             </a:r>
             <a:r>
               <a:rPr lang="en-GB" sz="1600" dirty="0" err="1"/>
-              <a:t>l’aspetto</a:t>
+              <a:t>ancora</a:t>
             </a:r>
             <a:r>
               <a:rPr lang="en-GB" sz="1600" dirty="0"/>
@@ -11215,15 +11492,15 @@
             </a:r>
             <a:r>
               <a:rPr lang="en-GB" sz="1600" dirty="0" err="1"/>
-              <a:t>etico</a:t>
+              <a:t>più</a:t>
             </a:r>
             <a:r>
               <a:rPr lang="en-GB" sz="1600" dirty="0"/>
-              <a:t>, </a:t>
+              <a:t> forza e </a:t>
             </a:r>
             <a:r>
               <a:rPr lang="en-GB" sz="1600" dirty="0" err="1"/>
-              <a:t>fondamentale</a:t>
+              <a:t>slancio</a:t>
             </a:r>
             <a:r>
               <a:rPr lang="en-GB" sz="1600" dirty="0"/>
@@ -11231,7 +11508,7 @@
             </a:r>
             <a:r>
               <a:rPr lang="en-GB" sz="1600" dirty="0" err="1"/>
-              <a:t>quando</a:t>
+              <a:t>all’obiettivo</a:t>
             </a:r>
             <a:r>
               <a:rPr lang="en-GB" sz="1600" dirty="0"/>
@@ -11239,7 +11516,15 @@
             </a:r>
             <a:r>
               <a:rPr lang="en-GB" sz="1600" dirty="0" err="1"/>
-              <a:t>si</a:t>
+              <a:t>che</a:t>
+            </a:r>
+            <a:r>
+              <a:rPr lang="en-GB" sz="1600" dirty="0"/>
+              <a:t> Hoda, con Weople, </a:t>
+            </a:r>
+            <a:r>
+              <a:rPr lang="en-GB" sz="1600" dirty="0" err="1"/>
+              <a:t>vuole</a:t>
             </a:r>
             <a:r>
               <a:rPr lang="en-GB" sz="1600" dirty="0"/>
@@ -11247,15 +11532,25 @@
             </a:r>
             <a:r>
               <a:rPr lang="en-GB" sz="1600" dirty="0" err="1"/>
-              <a:t>parla</a:t>
+              <a:t>raggiungere</a:t>
             </a:r>
             <a:r>
               <a:rPr lang="en-GB" sz="1600" dirty="0"/>
-              <a:t> di </a:t>
-            </a:r>
+              <a:t>: </a:t>
+            </a:r>
+          </a:p>
+          <a:p>
             <a:r>
               <a:rPr lang="en-GB" sz="1600" dirty="0" err="1"/>
-              <a:t>utilizzo</a:t>
+              <a:t>rendere</a:t>
+            </a:r>
+            <a:r>
+              <a:rPr lang="en-GB" sz="1600" dirty="0"/>
+              <a:t> le </a:t>
+            </a:r>
+            <a:r>
+              <a:rPr lang="en-GB" sz="1600" dirty="0" err="1"/>
+              <a:t>persone</a:t>
             </a:r>
             <a:r>
               <a:rPr lang="en-GB" sz="1600" dirty="0"/>
@@ -11263,7 +11558,15 @@
             </a:r>
             <a:r>
               <a:rPr lang="en-GB" sz="1600" dirty="0" err="1"/>
-              <a:t>dei</a:t>
+              <a:t>protagoniste</a:t>
+            </a:r>
+            <a:r>
+              <a:rPr lang="en-GB" sz="1600" dirty="0"/>
+              <a:t>, dare </a:t>
+            </a:r>
+            <a:r>
+              <a:rPr lang="en-GB" sz="1600" dirty="0" err="1"/>
+              <a:t>loro</a:t>
             </a:r>
             <a:r>
               <a:rPr lang="en-GB" sz="1600" dirty="0"/>
@@ -11271,31 +11574,39 @@
             </a:r>
             <a:r>
               <a:rPr lang="en-GB" sz="1600" dirty="0" err="1"/>
-              <a:t>dati</a:t>
+              <a:t>controllo</a:t>
             </a:r>
             <a:r>
               <a:rPr lang="en-GB" sz="1600" dirty="0"/>
-              <a:t>, in </a:t>
+              <a:t> e </a:t>
             </a:r>
             <a:r>
               <a:rPr lang="en-GB" sz="1600" dirty="0" err="1"/>
-              <a:t>quanto</a:t>
+              <a:t>centralità</a:t>
             </a:r>
             <a:r>
               <a:rPr lang="en-GB" sz="1600" dirty="0"/>
-              <a:t> la </a:t>
+              <a:t> in </a:t>
             </a:r>
             <a:r>
               <a:rPr lang="en-GB" sz="1600" dirty="0" err="1"/>
-              <a:t>soluzione</a:t>
+              <a:t>ambito</a:t>
             </a:r>
             <a:r>
               <a:rPr lang="en-GB" sz="1600" dirty="0"/>
-              <a:t> è </a:t>
+              <a:t> di big data, </a:t>
             </a:r>
             <a:r>
               <a:rPr lang="en-GB" sz="1600" dirty="0" err="1"/>
-              <a:t>totalmente</a:t>
+              <a:t>affinché</a:t>
+            </a:r>
+            <a:r>
+              <a:rPr lang="en-GB" sz="1600" dirty="0"/>
+              <a:t> ne </a:t>
+            </a:r>
+            <a:r>
+              <a:rPr lang="en-GB" sz="1600" dirty="0" err="1"/>
+              <a:t>traggano</a:t>
             </a:r>
             <a:r>
               <a:rPr lang="en-GB" sz="1600" dirty="0"/>
@@ -11303,274 +11614,19 @@
             </a:r>
             <a:r>
               <a:rPr lang="en-GB" sz="1600" dirty="0" err="1"/>
-              <a:t>trasparente</a:t>
+              <a:t>vantaggio</a:t>
             </a:r>
             <a:r>
               <a:rPr lang="en-GB" sz="1600" dirty="0"/>
-              <a:t> e </a:t>
+              <a:t> in prima persona e non li </a:t>
             </a:r>
             <a:r>
               <a:rPr lang="en-GB" sz="1600" dirty="0" err="1"/>
-              <a:t>contribuirebbe</a:t>
+              <a:t>subiscano</a:t>
             </a:r>
             <a:r>
               <a:rPr lang="en-GB" sz="1600" dirty="0"/>
-              <a:t> ad </a:t>
-            </a:r>
-            <a:r>
-              <a:rPr lang="en-GB" sz="1600" dirty="0" err="1"/>
-              <a:t>aumentare</a:t>
-            </a:r>
-            <a:r>
-              <a:rPr lang="en-GB" sz="1600" dirty="0"/>
-              <a:t> la </a:t>
-            </a:r>
-            <a:r>
-              <a:rPr lang="en-GB" sz="1600" dirty="0" err="1"/>
-              <a:t>consapevolezza</a:t>
-            </a:r>
-            <a:r>
-              <a:rPr lang="en-GB" sz="1600" dirty="0"/>
-              <a:t> </a:t>
-            </a:r>
-            <a:r>
-              <a:rPr lang="en-GB" sz="1600" dirty="0" err="1"/>
-              <a:t>delle</a:t>
-            </a:r>
-            <a:r>
-              <a:rPr lang="en-GB" sz="1600" dirty="0"/>
-              <a:t> </a:t>
-            </a:r>
-            <a:r>
-              <a:rPr lang="en-GB" sz="1600" dirty="0" err="1"/>
-              <a:t>persone</a:t>
-            </a:r>
-            <a:r>
-              <a:rPr lang="en-GB" sz="1600" dirty="0"/>
-              <a:t> </a:t>
-            </a:r>
-            <a:r>
-              <a:rPr lang="en-GB" sz="1600" dirty="0" err="1"/>
-              <a:t>sull’importanza</a:t>
-            </a:r>
-            <a:r>
-              <a:rPr lang="en-GB" sz="1600" dirty="0"/>
-              <a:t> </a:t>
-            </a:r>
-            <a:r>
-              <a:rPr lang="en-GB" sz="1600" dirty="0" err="1"/>
-              <a:t>dei</a:t>
-            </a:r>
-            <a:r>
-              <a:rPr lang="en-GB" sz="1600" dirty="0"/>
-              <a:t> </a:t>
-            </a:r>
-            <a:r>
-              <a:rPr lang="en-GB" sz="1600" dirty="0" err="1"/>
-              <a:t>propri</a:t>
-            </a:r>
-            <a:r>
-              <a:rPr lang="en-GB" sz="1600" dirty="0"/>
-              <a:t> </a:t>
-            </a:r>
-            <a:r>
-              <a:rPr lang="en-GB" sz="1600" dirty="0" err="1"/>
-              <a:t>dati</a:t>
-            </a:r>
-            <a:r>
-              <a:rPr lang="en-GB" sz="1600" dirty="0"/>
-              <a:t>.</a:t>
-            </a:r>
-          </a:p>
-          <a:p>
-            <a:endParaRPr lang="en-GB" sz="1600" dirty="0"/>
-          </a:p>
-          <a:p>
-            <a:r>
-              <a:rPr lang="en-GB" sz="1600" dirty="0" err="1"/>
-              <a:t>Questo</a:t>
-            </a:r>
-            <a:r>
-              <a:rPr lang="en-GB" sz="1600" dirty="0"/>
-              <a:t> </a:t>
-            </a:r>
-            <a:r>
-              <a:rPr lang="en-GB" sz="1600" dirty="0" err="1"/>
-              <a:t>servizio</a:t>
-            </a:r>
-            <a:r>
-              <a:rPr lang="en-GB" sz="1600" dirty="0"/>
-              <a:t> </a:t>
-            </a:r>
-            <a:r>
-              <a:rPr lang="en-GB" sz="1600" dirty="0" err="1"/>
-              <a:t>darebbe</a:t>
-            </a:r>
-            <a:r>
-              <a:rPr lang="en-GB" sz="1600" dirty="0"/>
-              <a:t> </a:t>
-            </a:r>
-            <a:r>
-              <a:rPr lang="en-GB" sz="1600" dirty="0" err="1"/>
-              <a:t>ancora</a:t>
-            </a:r>
-            <a:r>
-              <a:rPr lang="en-GB" sz="1600" dirty="0"/>
-              <a:t> </a:t>
-            </a:r>
-            <a:r>
-              <a:rPr lang="en-GB" sz="1600" dirty="0" err="1"/>
-              <a:t>più</a:t>
-            </a:r>
-            <a:r>
-              <a:rPr lang="en-GB" sz="1600" dirty="0"/>
-              <a:t> forza e </a:t>
-            </a:r>
-            <a:r>
-              <a:rPr lang="en-GB" sz="1600" dirty="0" err="1"/>
-              <a:t>slancio</a:t>
-            </a:r>
-            <a:r>
-              <a:rPr lang="en-GB" sz="1600" dirty="0"/>
-              <a:t> </a:t>
-            </a:r>
-            <a:r>
-              <a:rPr lang="en-GB" sz="1600" dirty="0" err="1"/>
-              <a:t>all’obiettivo</a:t>
-            </a:r>
-            <a:r>
-              <a:rPr lang="en-GB" sz="1600" dirty="0"/>
-              <a:t> </a:t>
-            </a:r>
-            <a:r>
-              <a:rPr lang="en-GB" sz="1600" dirty="0" err="1"/>
-              <a:t>che</a:t>
-            </a:r>
-            <a:r>
-              <a:rPr lang="en-GB" sz="1600" dirty="0"/>
-              <a:t> Hoda, con Weople, </a:t>
-            </a:r>
-            <a:r>
-              <a:rPr lang="en-GB" sz="1600" dirty="0" err="1"/>
-              <a:t>vuole</a:t>
-            </a:r>
-            <a:r>
-              <a:rPr lang="en-GB" sz="1600" dirty="0"/>
-              <a:t> </a:t>
-            </a:r>
-            <a:r>
-              <a:rPr lang="en-GB" sz="1600" dirty="0" err="1"/>
-              <a:t>raggiungere</a:t>
-            </a:r>
-            <a:r>
-              <a:rPr lang="en-GB" sz="1600" dirty="0"/>
-              <a:t>: </a:t>
-            </a:r>
-          </a:p>
-          <a:p>
-            <a:r>
-              <a:rPr lang="en-GB" sz="1600" dirty="0" err="1"/>
-              <a:t>rendere</a:t>
-            </a:r>
-            <a:r>
-              <a:rPr lang="en-GB" sz="1600" dirty="0"/>
-              <a:t> le </a:t>
-            </a:r>
-            <a:r>
-              <a:rPr lang="en-GB" sz="1600" dirty="0" err="1"/>
-              <a:t>persone</a:t>
-            </a:r>
-            <a:r>
-              <a:rPr lang="en-GB" sz="1600" dirty="0"/>
-              <a:t> </a:t>
-            </a:r>
-            <a:r>
-              <a:rPr lang="en-GB" sz="1600" dirty="0" err="1"/>
-              <a:t>protagoniste</a:t>
-            </a:r>
-            <a:r>
-              <a:rPr lang="en-GB" sz="1600" dirty="0"/>
-              <a:t> e dare </a:t>
-            </a:r>
-            <a:r>
-              <a:rPr lang="en-GB" sz="1600" dirty="0" err="1"/>
-              <a:t>loro</a:t>
-            </a:r>
-            <a:r>
-              <a:rPr lang="en-GB" sz="1600" dirty="0"/>
-              <a:t> </a:t>
-            </a:r>
-            <a:r>
-              <a:rPr lang="en-GB" sz="1600" dirty="0" err="1"/>
-              <a:t>più</a:t>
-            </a:r>
-            <a:r>
-              <a:rPr lang="en-GB" sz="1600" dirty="0"/>
-              <a:t> </a:t>
-            </a:r>
-            <a:r>
-              <a:rPr lang="en-GB" sz="1600" dirty="0" err="1"/>
-              <a:t>controllo</a:t>
-            </a:r>
-            <a:r>
-              <a:rPr lang="en-GB" sz="1600" dirty="0"/>
-              <a:t> </a:t>
-            </a:r>
-            <a:r>
-              <a:rPr lang="en-GB" sz="1600" dirty="0" err="1"/>
-              <a:t>sull’uso</a:t>
-            </a:r>
-            <a:r>
-              <a:rPr lang="en-GB" sz="1600" dirty="0"/>
-              <a:t> </a:t>
-            </a:r>
-            <a:r>
-              <a:rPr lang="en-GB" sz="1600" dirty="0" err="1"/>
-              <a:t>che</a:t>
-            </a:r>
-            <a:r>
-              <a:rPr lang="en-GB" sz="1600" dirty="0"/>
-              <a:t> </a:t>
-            </a:r>
-            <a:r>
-              <a:rPr lang="en-GB" sz="1600" dirty="0" err="1"/>
-              <a:t>viene</a:t>
-            </a:r>
-            <a:r>
-              <a:rPr lang="en-GB" sz="1600" dirty="0"/>
-              <a:t> </a:t>
-            </a:r>
-            <a:r>
-              <a:rPr lang="en-GB" sz="1600" dirty="0" err="1"/>
-              <a:t>fatto</a:t>
-            </a:r>
-            <a:r>
-              <a:rPr lang="en-GB" sz="1600" dirty="0"/>
-              <a:t> </a:t>
-            </a:r>
-            <a:r>
-              <a:rPr lang="en-GB" sz="1600" dirty="0" err="1"/>
-              <a:t>dei</a:t>
-            </a:r>
-            <a:r>
-              <a:rPr lang="en-GB" sz="1600" dirty="0"/>
-              <a:t> </a:t>
-            </a:r>
-            <a:r>
-              <a:rPr lang="en-GB" sz="1600" dirty="0" err="1"/>
-              <a:t>propri</a:t>
-            </a:r>
-            <a:r>
-              <a:rPr lang="en-GB" sz="1600" dirty="0"/>
-              <a:t> </a:t>
-            </a:r>
-            <a:r>
-              <a:rPr lang="en-GB" sz="1600" dirty="0" err="1"/>
-              <a:t>dati</a:t>
-            </a:r>
-            <a:r>
-              <a:rPr lang="en-GB" sz="1600" dirty="0"/>
-              <a:t>.</a:t>
+              <a:t> e basta.</a:t>
             </a:r>
           </a:p>
         </p:txBody>
@@ -13647,7 +13703,7 @@
         <p:spPr>
           <a:xfrm>
             <a:off x="847562" y="661432"/>
-            <a:ext cx="10942223" cy="6196568"/>
+            <a:ext cx="10942223" cy="6388928"/>
           </a:xfrm>
           <a:prstGeom prst="rect">
             <a:avLst/>
@@ -13670,7 +13726,7 @@
             </a:pPr>
             <a:r>
               <a:rPr lang="it-IT" sz="1300" dirty="0"/>
-              <a:t>Hoda, con la sua soluzione, vuole raccontare un nuovo tipo di esperienza tra persone e aziende basato sull'uso consapevole dei dati e sul rispetto della privacy, a completo beneficio di tutte le parti coinvolte.</a:t>
+              <a:t>Hoda, con la sua soluzione, vuole supportare un nuovo tipo di esperienza tra persone e aziende basato sull'uso consapevole dei dati e sul rispetto della privacy, a completo beneficio di tutte le parti coinvolte.</a:t>
             </a:r>
           </a:p>
           <a:p>
@@ -13698,7 +13754,7 @@
             </a:pPr>
             <a:r>
               <a:rPr lang="it-IT" sz="1300" dirty="0"/>
-              <a:t>Il punto di partenza è la persona, che decide di iscriversi a Weople, un servizio gratuito già esistente, sviluppato da Hoda, che permette alle persone di attivare i diritti del GDPR, come il Diritto alla Portabilità e il Diritto di Opposizione. Inoltre, Weople agisce come banca dei dati digitali, permettendo alle persone di investire i propri dati in modo anonimo. Gli archivi dei dati che le persone possono investire in Weople spaziano dai dati delle carte fedeltà ai dati di e-commerce a quelli dei social network. La mole di dati è grandissima e Hoda, con il consenso informato dei suoi utenti, valorizza questi dati sul mercato in modo completamente anonimo, statistico e aggregato. Una volta che questo Big Data è stato valorizzato sul mercato e ha generato utili, Weople ridistribuisce ai suoi utenti il 90% dei profitti.</a:t>
+              <a:t>Il punto di partenza è la persona, che decide di iscriversi a Weople, un servizio gratuito già esistente, sviluppato da Hoda, che permette alle persone di attivare i diritti del GDPR, come il Diritto alla Portabilità e il Diritto di Revisione delle autorizzazioni sui dati. Inoltre, Weople agisce come una banca ma di dati digitali, permettendo alle persone di investire i propri dati in modo anonimo, aggregato e statistico. Gli archivi dei dati che le persone possono raccogliere in Weople spaziano dai dati delle carte fedeltà ai dati di e-commerce a quelli dei social network. La mole di dati è grandissima e Hoda, in nome e per conto dei suoi utenti, valorizza questi dati sul mercato in modo completamente anonimo, statistico e aggregato. Una volta che questo Big Data è stato valorizzato sul mercato e ha generato utili, Weople ridistribuisce ai suoi utenti il 90% dei profitti, insieme a servizi, basati sui dati, che hanno l'obiettivo di migliorare la vita delle persone</a:t>
             </a:r>
           </a:p>
           <a:p>
@@ -13712,7 +13768,7 @@
             </a:pPr>
             <a:r>
               <a:rPr lang="it-IT" sz="1300" dirty="0"/>
-              <a:t>Il nostro use case vede partecipi Hoda, un'azienda di Food Delivery e gli utenti di Weople. L’azienda in questione è interessata a proporre il proprio prodotto, tramite un'offerta personalizzata, ad un bacino di utenti con determinate caratteristiche socio-demografiche e particolari abitudini, interessi e livelli di consumo. Tutti dati che Weople ha a disposizione, se investiti dalle persone. Hoda funge da aggregatore di persone, quindi di dati, garantendo privacy e sicurezza.</a:t>
+              <a:t>Il nostro use case vede partecipi Hoda, un'azienda di Food Delivery e gli utenti di Weople. L’azienda in questione è interessata a proporre il proprio prodotto, tramite un'offerta personalizzata, ad un bacino di utenti con determinate caratteristiche socio-demografiche e particolari abitudini, interessi e livelli di consumo. Tutti dati che Weople ha a disposizione, se raccolti e investiti dalle persone nella app. Hoda può quindi fungere da facilitatore fra le parti garantendo entrambe le parti da tutti i punti di vista.</a:t>
             </a:r>
           </a:p>
           <a:p>
@@ -13786,7 +13842,7 @@
             </a:pPr>
             <a:r>
               <a:rPr lang="it-IT" sz="1300" dirty="0"/>
-              <a:t>Una volta completato l'acquisto, se fosse presente anche un'intermediazione digitale, Weople si impegnerebbe a ridistribuirla alle persone nella misura del 90%, al netto dei costi di mantenimento della piattaforma.</a:t>
+              <a:t>Una volta completato l'acquisto, se fosse prevista un'intermediazione digitale, Weople si impegnerebbe a ridistribuirla alle persone nella misura del 90%, al netto dei costi di mantenimento della piattaforma.</a:t>
             </a:r>
           </a:p>
           <a:p>
@@ -13800,7 +13856,7 @@
             </a:pPr>
             <a:r>
               <a:rPr lang="it-IT" sz="1300" dirty="0"/>
-              <a:t>All'interno di questo use case vediamo, in modo semplificato, come attraverso l'uso dei dati, si possa creare un nuovo rapporto tra persone e aziende del tutto protettivo della privacy e con benefici per tutti gli attori della filiera, diversamente da quello che avviene oggi, in qui i dati delle persone generano guadagni per tutti fuorché per coloro che li generano, le persone.</a:t>
+              <a:t>All'interno di questo use case vediamo, in modo semplificato, come, attraverso un Banca dei dati delle persone e i sistemi di certificazione dei dati stessi, si possa creare un nuovo rapporto tra persone e le aziende, del tutto protettivo della privacy e con benefici diretti per tutti gli attori della filiera, diversamente da quello che avviene normalmente, per cui i dati delle persone generano guadagni per tutti fuorché per le persone stesse</a:t>
             </a:r>
           </a:p>
         </p:txBody>
@@ -14295,7 +14351,7 @@
         <p:spPr>
           <a:xfrm>
             <a:off x="847562" y="1166842"/>
-            <a:ext cx="10558463" cy="4524315"/>
+            <a:ext cx="10558463" cy="5016758"/>
           </a:xfrm>
           <a:prstGeom prst="rect">
             <a:avLst/>
@@ -14320,7 +14376,7 @@
             </a:pPr>
             <a:r>
               <a:rPr lang="it-IT" sz="1600" dirty="0"/>
-              <a:t>Galileo → Profilazione Data Science → software proprietario</a:t>
+              <a:t>Software di gestione statistica dei dati</a:t>
             </a:r>
           </a:p>
           <a:p>
@@ -14340,7 +14396,7 @@
             </a:pPr>
             <a:r>
               <a:rPr lang="it-IT" sz="1600" dirty="0"/>
-              <a:t>Cheetah Digital → CRM di terze parti → Web site + API</a:t>
+              <a:t>Cheetah Digital = CRM → con connessione a Web site + API</a:t>
             </a:r>
           </a:p>
           <a:p>
@@ -14349,8 +14405,12 @@
               <a:buChar char="•"/>
             </a:pPr>
             <a:r>
+              <a:rPr lang="it-IT" sz="1600" dirty="0" err="1"/>
+              <a:t>Weople</a:t>
+            </a:r>
+            <a:r>
               <a:rPr lang="it-IT" sz="1600" dirty="0"/>
-              <a:t>Weople → App sviluppata da Hoda → </a:t>
+              <a:t> = App sviluppata da Hoda → </a:t>
             </a:r>
             <a:r>
               <a:rPr lang="it-IT" sz="1600" dirty="0" err="1"/>
@@ -14390,7 +14450,7 @@
           <a:p>
             <a:r>
               <a:rPr lang="it-IT" sz="1600" dirty="0"/>
-              <a:t>Il data scientist converte la richiesta del cliente in un filtro per creare il segmento richiesto, una volta affinata la ricerca viene esportata una lista di utenti con i dati richiesti per creare la credenziale in formato CSV.</a:t>
+              <a:t>Il data scientist converte la richiesta del cliente in un filtro per creare il segmento richiesto, una volta affinata la ricerca, viene esportata una lista di utenti in formato CSV con i dati richiesti per creare la credenziale.</a:t>
             </a:r>
           </a:p>
           <a:p>
@@ -14407,7 +14467,7 @@
             </a:r>
             <a:r>
               <a:rPr lang="it-IT" sz="1600" dirty="0"/>
-              <a:t> penserà poi a creare le offerte personalizzate su nostro CRM tramite le API esposte.</a:t>
+              <a:t> penserà, in parallelo, a creare le offerte personalizzate in app, su nostro CRM, tramite le API esposte.</a:t>
             </a:r>
           </a:p>
           <a:p>
@@ -14416,7 +14476,15 @@
           <a:p>
             <a:r>
               <a:rPr lang="it-IT" sz="1600" dirty="0"/>
-              <a:t>Una volta pubblicata l’offerta personalizzata, sarà visibile agli utenti Weople che potranno selezionarla per esportare la credenziale al proprio </a:t>
+              <a:t>Una volta pubblicata l’offerta personalizzata, questa sarà visibile agli utenti </a:t>
+            </a:r>
+            <a:r>
+              <a:rPr lang="it-IT" sz="1600" dirty="0" err="1"/>
+              <a:t>Weople</a:t>
+            </a:r>
+            <a:r>
+              <a:rPr lang="it-IT" sz="1600" dirty="0"/>
+              <a:t> del segmento voluto, che potranno selezionarla per esportare la credenziale al proprio </a:t>
             </a:r>
             <a:r>
               <a:rPr lang="it-IT" sz="1600" dirty="0" err="1"/>
@@ -14432,7 +14500,7 @@
             </a:r>
             <a:r>
               <a:rPr lang="it-IT" sz="1600" dirty="0"/>
-              <a:t> per poi essere spese presso le aziende interessate.</a:t>
+              <a:t> per poi essere spesa presso l'azienda interessata.</a:t>
             </a:r>
           </a:p>
           <a:p>
@@ -14445,7 +14513,7 @@
             </a:r>
             <a:r>
               <a:rPr lang="it-IT" sz="1600" dirty="0" err="1"/>
-              <a:t>DizMe</a:t>
+              <a:t>Dizme</a:t>
             </a:r>
             <a:r>
               <a:rPr lang="it-IT" sz="1600" dirty="0"/>
@@ -15844,18 +15912,18 @@
 </file>
 
 <file path=customXml/item1.xml><?xml version="1.0" encoding="utf-8"?>
+<p:properties xmlns:p="http://schemas.microsoft.com/office/2006/metadata/properties" xmlns:xsi="http://www.w3.org/2001/XMLSchema-instance" xmlns:pc="http://schemas.microsoft.com/office/infopath/2007/PartnerControls">
+  <documentManagement/>
+</p:properties>
+</file>
+
+<file path=customXml/item2.xml><?xml version="1.0" encoding="utf-8"?>
 <?mso-contentType ?>
 <FormTemplates xmlns="http://schemas.microsoft.com/sharepoint/v3/contenttype/forms">
   <Display>DocumentLibraryForm</Display>
   <Edit>DocumentLibraryForm</Edit>
   <New>DocumentLibraryForm</New>
 </FormTemplates>
-</file>
-
-<file path=customXml/item2.xml><?xml version="1.0" encoding="utf-8"?>
-<p:properties xmlns:p="http://schemas.microsoft.com/office/2006/metadata/properties" xmlns:xsi="http://www.w3.org/2001/XMLSchema-instance" xmlns:pc="http://schemas.microsoft.com/office/infopath/2007/PartnerControls">
-  <documentManagement/>
-</p:properties>
 </file>
 
 <file path=customXml/item3.xml><?xml version="1.0" encoding="utf-8"?>
@@ -16023,14 +16091,6 @@
 </file>
 
 <file path=customXml/itemProps1.xml><?xml version="1.0" encoding="utf-8"?>
-<ds:datastoreItem xmlns:ds="http://schemas.openxmlformats.org/officeDocument/2006/customXml" ds:itemID="{FED33DBE-5CD5-4048-B963-E1DDF7CD72BE}">
-  <ds:schemaRefs>
-    <ds:schemaRef ds:uri="http://schemas.microsoft.com/sharepoint/v3/contenttype/forms"/>
-  </ds:schemaRefs>
-</ds:datastoreItem>
-</file>
-
-<file path=customXml/itemProps2.xml><?xml version="1.0" encoding="utf-8"?>
 <ds:datastoreItem xmlns:ds="http://schemas.openxmlformats.org/officeDocument/2006/customXml" ds:itemID="{AEBCF798-F9F3-45AA-B3F9-BB4D0150171E}">
   <ds:schemaRefs>
     <ds:schemaRef ds:uri="http://www.w3.org/XML/1998/namespace"/>
@@ -16042,6 +16102,14 @@
     <ds:schemaRef ds:uri="http://schemas.microsoft.com/office/infopath/2007/PartnerControls"/>
     <ds:schemaRef ds:uri="http://schemas.openxmlformats.org/package/2006/metadata/core-properties"/>
     <ds:schemaRef ds:uri="5a59f87f-1d96-4d14-88b1-9d5dda5431c2"/>
+  </ds:schemaRefs>
+</ds:datastoreItem>
+</file>
+
+<file path=customXml/itemProps2.xml><?xml version="1.0" encoding="utf-8"?>
+<ds:datastoreItem xmlns:ds="http://schemas.openxmlformats.org/officeDocument/2006/customXml" ds:itemID="{FED33DBE-5CD5-4048-B963-E1DDF7CD72BE}">
+  <ds:schemaRefs>
+    <ds:schemaRef ds:uri="http://schemas.microsoft.com/sharepoint/v3/contenttype/forms"/>
   </ds:schemaRefs>
 </ds:datastoreItem>
 </file>

</xml_diff>